<commit_message>
add and minus btns
</commit_message>
<xml_diff>
--- a/wb techteacher/images/site_icons.pptx
+++ b/wb techteacher/images/site_icons.pptx
@@ -259,7 +259,7 @@
           <a:p>
             <a:fld id="{E43D5AD4-153E-40C2-AC84-AA87938D42DF}" type="datetimeFigureOut">
               <a:rPr lang="en-US" smtClean="0"/>
-              <a:t>4/17/2021</a:t>
+              <a:t>6/4/2021</a:t>
             </a:fld>
             <a:endParaRPr lang="en-US"/>
           </a:p>
@@ -457,7 +457,7 @@
           <a:p>
             <a:fld id="{E43D5AD4-153E-40C2-AC84-AA87938D42DF}" type="datetimeFigureOut">
               <a:rPr lang="en-US" smtClean="0"/>
-              <a:t>4/17/2021</a:t>
+              <a:t>6/4/2021</a:t>
             </a:fld>
             <a:endParaRPr lang="en-US"/>
           </a:p>
@@ -665,7 +665,7 @@
           <a:p>
             <a:fld id="{E43D5AD4-153E-40C2-AC84-AA87938D42DF}" type="datetimeFigureOut">
               <a:rPr lang="en-US" smtClean="0"/>
-              <a:t>4/17/2021</a:t>
+              <a:t>6/4/2021</a:t>
             </a:fld>
             <a:endParaRPr lang="en-US"/>
           </a:p>
@@ -863,7 +863,7 @@
           <a:p>
             <a:fld id="{E43D5AD4-153E-40C2-AC84-AA87938D42DF}" type="datetimeFigureOut">
               <a:rPr lang="en-US" smtClean="0"/>
-              <a:t>4/17/2021</a:t>
+              <a:t>6/4/2021</a:t>
             </a:fld>
             <a:endParaRPr lang="en-US"/>
           </a:p>
@@ -1138,7 +1138,7 @@
           <a:p>
             <a:fld id="{E43D5AD4-153E-40C2-AC84-AA87938D42DF}" type="datetimeFigureOut">
               <a:rPr lang="en-US" smtClean="0"/>
-              <a:t>4/17/2021</a:t>
+              <a:t>6/4/2021</a:t>
             </a:fld>
             <a:endParaRPr lang="en-US"/>
           </a:p>
@@ -1403,7 +1403,7 @@
           <a:p>
             <a:fld id="{E43D5AD4-153E-40C2-AC84-AA87938D42DF}" type="datetimeFigureOut">
               <a:rPr lang="en-US" smtClean="0"/>
-              <a:t>4/17/2021</a:t>
+              <a:t>6/4/2021</a:t>
             </a:fld>
             <a:endParaRPr lang="en-US"/>
           </a:p>
@@ -1815,7 +1815,7 @@
           <a:p>
             <a:fld id="{E43D5AD4-153E-40C2-AC84-AA87938D42DF}" type="datetimeFigureOut">
               <a:rPr lang="en-US" smtClean="0"/>
-              <a:t>4/17/2021</a:t>
+              <a:t>6/4/2021</a:t>
             </a:fld>
             <a:endParaRPr lang="en-US"/>
           </a:p>
@@ -1956,7 +1956,7 @@
           <a:p>
             <a:fld id="{E43D5AD4-153E-40C2-AC84-AA87938D42DF}" type="datetimeFigureOut">
               <a:rPr lang="en-US" smtClean="0"/>
-              <a:t>4/17/2021</a:t>
+              <a:t>6/4/2021</a:t>
             </a:fld>
             <a:endParaRPr lang="en-US"/>
           </a:p>
@@ -2069,7 +2069,7 @@
           <a:p>
             <a:fld id="{E43D5AD4-153E-40C2-AC84-AA87938D42DF}" type="datetimeFigureOut">
               <a:rPr lang="en-US" smtClean="0"/>
-              <a:t>4/17/2021</a:t>
+              <a:t>6/4/2021</a:t>
             </a:fld>
             <a:endParaRPr lang="en-US"/>
           </a:p>
@@ -2380,7 +2380,7 @@
           <a:p>
             <a:fld id="{E43D5AD4-153E-40C2-AC84-AA87938D42DF}" type="datetimeFigureOut">
               <a:rPr lang="en-US" smtClean="0"/>
-              <a:t>4/17/2021</a:t>
+              <a:t>6/4/2021</a:t>
             </a:fld>
             <a:endParaRPr lang="en-US"/>
           </a:p>
@@ -2668,7 +2668,7 @@
           <a:p>
             <a:fld id="{E43D5AD4-153E-40C2-AC84-AA87938D42DF}" type="datetimeFigureOut">
               <a:rPr lang="en-US" smtClean="0"/>
-              <a:t>4/17/2021</a:t>
+              <a:t>6/4/2021</a:t>
             </a:fld>
             <a:endParaRPr lang="en-US"/>
           </a:p>
@@ -2909,7 +2909,7 @@
           <a:p>
             <a:fld id="{E43D5AD4-153E-40C2-AC84-AA87938D42DF}" type="datetimeFigureOut">
               <a:rPr lang="en-US" smtClean="0"/>
-              <a:t>4/17/2021</a:t>
+              <a:t>6/4/2021</a:t>
             </a:fld>
             <a:endParaRPr lang="en-US"/>
           </a:p>
@@ -3443,7 +3443,7 @@
         </p:blipFill>
         <p:spPr>
           <a:xfrm>
-            <a:off x="4010718" y="561113"/>
+            <a:off x="3645625" y="363408"/>
             <a:ext cx="2204358" cy="2204358"/>
           </a:xfrm>
           <a:prstGeom prst="rect">
@@ -3481,8 +3481,164 @@
         </p:blipFill>
         <p:spPr>
           <a:xfrm>
-            <a:off x="7281209" y="561113"/>
+            <a:off x="6848751" y="579661"/>
             <a:ext cx="2204358" cy="2204358"/>
+          </a:xfrm>
+          <a:prstGeom prst="rect">
+            <a:avLst/>
+          </a:prstGeom>
+        </p:spPr>
+      </p:pic>
+      <p:pic>
+        <p:nvPicPr>
+          <p:cNvPr id="3" name="Graphic 2" descr="Basic Shapes with solid fill">
+            <a:extLst>
+              <a:ext uri="{FF2B5EF4-FFF2-40B4-BE49-F238E27FC236}">
+                <a16:creationId xmlns:a16="http://schemas.microsoft.com/office/drawing/2014/main" id="{B3844CD7-A95A-4DA8-B058-16104750C671}"/>
+              </a:ext>
+            </a:extLst>
+          </p:cNvPr>
+          <p:cNvPicPr>
+            <a:picLocks noChangeAspect="1"/>
+          </p:cNvPicPr>
+          <p:nvPr/>
+        </p:nvPicPr>
+        <p:blipFill>
+          <a:blip r:embed="rId8">
+            <a:extLst>
+              <a:ext uri="{28A0092B-C50C-407E-A947-70E740481C1C}">
+                <a14:useLocalDpi xmlns:a14="http://schemas.microsoft.com/office/drawing/2010/main" val="0"/>
+              </a:ext>
+              <a:ext uri="{96DAC541-7B7A-43D3-8B79-37D633B846F1}">
+                <asvg:svgBlip xmlns:asvg="http://schemas.microsoft.com/office/drawing/2016/SVG/main" r:embed="rId9"/>
+              </a:ext>
+            </a:extLst>
+          </a:blip>
+          <a:stretch>
+            <a:fillRect/>
+          </a:stretch>
+        </p:blipFill>
+        <p:spPr>
+          <a:xfrm>
+            <a:off x="97974" y="3921872"/>
+            <a:ext cx="2743200" cy="2743200"/>
+          </a:xfrm>
+          <a:prstGeom prst="rect">
+            <a:avLst/>
+          </a:prstGeom>
+        </p:spPr>
+      </p:pic>
+      <p:pic>
+        <p:nvPicPr>
+          <p:cNvPr id="9" name="Graphic 8" descr="Flask with solid fill">
+            <a:extLst>
+              <a:ext uri="{FF2B5EF4-FFF2-40B4-BE49-F238E27FC236}">
+                <a16:creationId xmlns:a16="http://schemas.microsoft.com/office/drawing/2014/main" id="{078EA80D-E582-40AF-881E-0892B8C2B593}"/>
+              </a:ext>
+            </a:extLst>
+          </p:cNvPr>
+          <p:cNvPicPr>
+            <a:picLocks noChangeAspect="1"/>
+          </p:cNvPicPr>
+          <p:nvPr/>
+        </p:nvPicPr>
+        <p:blipFill>
+          <a:blip r:embed="rId10">
+            <a:extLst>
+              <a:ext uri="{28A0092B-C50C-407E-A947-70E740481C1C}">
+                <a14:useLocalDpi xmlns:a14="http://schemas.microsoft.com/office/drawing/2010/main" val="0"/>
+              </a:ext>
+              <a:ext uri="{96DAC541-7B7A-43D3-8B79-37D633B846F1}">
+                <asvg:svgBlip xmlns:asvg="http://schemas.microsoft.com/office/drawing/2016/SVG/main" r:embed="rId11"/>
+              </a:ext>
+            </a:extLst>
+          </a:blip>
+          <a:stretch>
+            <a:fillRect/>
+          </a:stretch>
+        </p:blipFill>
+        <p:spPr>
+          <a:xfrm>
+            <a:off x="6388825" y="3783547"/>
+            <a:ext cx="2743200" cy="2743200"/>
+          </a:xfrm>
+          <a:prstGeom prst="rect">
+            <a:avLst/>
+          </a:prstGeom>
+        </p:spPr>
+      </p:pic>
+      <p:pic>
+        <p:nvPicPr>
+          <p:cNvPr id="11" name="Graphic 10" descr="Flask outline">
+            <a:extLst>
+              <a:ext uri="{FF2B5EF4-FFF2-40B4-BE49-F238E27FC236}">
+                <a16:creationId xmlns:a16="http://schemas.microsoft.com/office/drawing/2014/main" id="{84A8F703-F8F2-4A85-8B65-36013DB47295}"/>
+              </a:ext>
+            </a:extLst>
+          </p:cNvPr>
+          <p:cNvPicPr>
+            <a:picLocks noChangeAspect="1"/>
+          </p:cNvPicPr>
+          <p:nvPr/>
+        </p:nvPicPr>
+        <p:blipFill>
+          <a:blip r:embed="rId12">
+            <a:extLst>
+              <a:ext uri="{28A0092B-C50C-407E-A947-70E740481C1C}">
+                <a14:useLocalDpi xmlns:a14="http://schemas.microsoft.com/office/drawing/2010/main" val="0"/>
+              </a:ext>
+              <a:ext uri="{96DAC541-7B7A-43D3-8B79-37D633B846F1}">
+                <asvg:svgBlip xmlns:asvg="http://schemas.microsoft.com/office/drawing/2016/SVG/main" r:embed="rId13"/>
+              </a:ext>
+            </a:extLst>
+          </a:blip>
+          <a:stretch>
+            <a:fillRect/>
+          </a:stretch>
+        </p:blipFill>
+        <p:spPr>
+          <a:xfrm>
+            <a:off x="9448800" y="3921872"/>
+            <a:ext cx="2743200" cy="2743200"/>
+          </a:xfrm>
+          <a:prstGeom prst="rect">
+            <a:avLst/>
+          </a:prstGeom>
+        </p:spPr>
+      </p:pic>
+      <p:pic>
+        <p:nvPicPr>
+          <p:cNvPr id="13" name="Graphic 12" descr="Basic Shapes outline">
+            <a:extLst>
+              <a:ext uri="{FF2B5EF4-FFF2-40B4-BE49-F238E27FC236}">
+                <a16:creationId xmlns:a16="http://schemas.microsoft.com/office/drawing/2014/main" id="{E02F77CF-709B-42E4-B335-273A1CB4F109}"/>
+              </a:ext>
+            </a:extLst>
+          </p:cNvPr>
+          <p:cNvPicPr>
+            <a:picLocks noChangeAspect="1"/>
+          </p:cNvPicPr>
+          <p:nvPr/>
+        </p:nvPicPr>
+        <p:blipFill>
+          <a:blip r:embed="rId14">
+            <a:extLst>
+              <a:ext uri="{28A0092B-C50C-407E-A947-70E740481C1C}">
+                <a14:useLocalDpi xmlns:a14="http://schemas.microsoft.com/office/drawing/2010/main" val="0"/>
+              </a:ext>
+              <a:ext uri="{96DAC541-7B7A-43D3-8B79-37D633B846F1}">
+                <asvg:svgBlip xmlns:asvg="http://schemas.microsoft.com/office/drawing/2016/SVG/main" r:embed="rId15"/>
+              </a:ext>
+            </a:extLst>
+          </a:blip>
+          <a:stretch>
+            <a:fillRect/>
+          </a:stretch>
+        </p:blipFill>
+        <p:spPr>
+          <a:xfrm>
+            <a:off x="3392112" y="3921872"/>
+            <a:ext cx="2743200" cy="2743200"/>
           </a:xfrm>
           <a:prstGeom prst="rect">
             <a:avLst/>

</xml_diff>